<commit_message>
Analisis Primeras Cuotas Mayo
</commit_message>
<xml_diff>
--- a/2. Proyectos/03_Fondo_de_garantias/Resultados_fondo_garantias.pptx
+++ b/2. Proyectos/03_Fondo_de_garantias/Resultados_fondo_garantias.pptx
@@ -106,6 +106,11 @@
       </a:defRPr>
     </a:lvl9pPr>
   </p:defaultTextStyle>
+  <p:extLst>
+    <p:ext uri="{EFAFB233-063F-42B5-8137-9DF3F51BA10A}">
+      <p15:sldGuideLst xmlns:p15="http://schemas.microsoft.com/office/powerpoint/2012/main"/>
+    </p:ext>
+  </p:extLst>
 </p:presentation>
 </file>
 
@@ -256,7 +261,7 @@
           <a:p>
             <a:fld id="{B05D53FB-63B3-4B71-A26A-64EB68AD5861}" type="datetimeFigureOut">
               <a:rPr lang="en-US" smtClean="0"/>
-              <a:t>6/27/2022</a:t>
+              <a:t>6/28/2022</a:t>
             </a:fld>
             <a:endParaRPr lang="en-US"/>
           </a:p>
@@ -454,7 +459,7 @@
           <a:p>
             <a:fld id="{B05D53FB-63B3-4B71-A26A-64EB68AD5861}" type="datetimeFigureOut">
               <a:rPr lang="en-US" smtClean="0"/>
-              <a:t>6/27/2022</a:t>
+              <a:t>6/28/2022</a:t>
             </a:fld>
             <a:endParaRPr lang="en-US"/>
           </a:p>
@@ -662,7 +667,7 @@
           <a:p>
             <a:fld id="{B05D53FB-63B3-4B71-A26A-64EB68AD5861}" type="datetimeFigureOut">
               <a:rPr lang="en-US" smtClean="0"/>
-              <a:t>6/27/2022</a:t>
+              <a:t>6/28/2022</a:t>
             </a:fld>
             <a:endParaRPr lang="en-US"/>
           </a:p>
@@ -860,7 +865,7 @@
           <a:p>
             <a:fld id="{B05D53FB-63B3-4B71-A26A-64EB68AD5861}" type="datetimeFigureOut">
               <a:rPr lang="en-US" smtClean="0"/>
-              <a:t>6/27/2022</a:t>
+              <a:t>6/28/2022</a:t>
             </a:fld>
             <a:endParaRPr lang="en-US"/>
           </a:p>
@@ -1135,7 +1140,7 @@
           <a:p>
             <a:fld id="{B05D53FB-63B3-4B71-A26A-64EB68AD5861}" type="datetimeFigureOut">
               <a:rPr lang="en-US" smtClean="0"/>
-              <a:t>6/27/2022</a:t>
+              <a:t>6/28/2022</a:t>
             </a:fld>
             <a:endParaRPr lang="en-US"/>
           </a:p>
@@ -1400,7 +1405,7 @@
           <a:p>
             <a:fld id="{B05D53FB-63B3-4B71-A26A-64EB68AD5861}" type="datetimeFigureOut">
               <a:rPr lang="en-US" smtClean="0"/>
-              <a:t>6/27/2022</a:t>
+              <a:t>6/28/2022</a:t>
             </a:fld>
             <a:endParaRPr lang="en-US"/>
           </a:p>
@@ -1812,7 +1817,7 @@
           <a:p>
             <a:fld id="{B05D53FB-63B3-4B71-A26A-64EB68AD5861}" type="datetimeFigureOut">
               <a:rPr lang="en-US" smtClean="0"/>
-              <a:t>6/27/2022</a:t>
+              <a:t>6/28/2022</a:t>
             </a:fld>
             <a:endParaRPr lang="en-US"/>
           </a:p>
@@ -1953,7 +1958,7 @@
           <a:p>
             <a:fld id="{B05D53FB-63B3-4B71-A26A-64EB68AD5861}" type="datetimeFigureOut">
               <a:rPr lang="en-US" smtClean="0"/>
-              <a:t>6/27/2022</a:t>
+              <a:t>6/28/2022</a:t>
             </a:fld>
             <a:endParaRPr lang="en-US"/>
           </a:p>
@@ -2066,7 +2071,7 @@
           <a:p>
             <a:fld id="{B05D53FB-63B3-4B71-A26A-64EB68AD5861}" type="datetimeFigureOut">
               <a:rPr lang="en-US" smtClean="0"/>
-              <a:t>6/27/2022</a:t>
+              <a:t>6/28/2022</a:t>
             </a:fld>
             <a:endParaRPr lang="en-US"/>
           </a:p>
@@ -2377,7 +2382,7 @@
           <a:p>
             <a:fld id="{B05D53FB-63B3-4B71-A26A-64EB68AD5861}" type="datetimeFigureOut">
               <a:rPr lang="en-US" smtClean="0"/>
-              <a:t>6/27/2022</a:t>
+              <a:t>6/28/2022</a:t>
             </a:fld>
             <a:endParaRPr lang="en-US"/>
           </a:p>
@@ -2665,7 +2670,7 @@
           <a:p>
             <a:fld id="{B05D53FB-63B3-4B71-A26A-64EB68AD5861}" type="datetimeFigureOut">
               <a:rPr lang="en-US" smtClean="0"/>
-              <a:t>6/27/2022</a:t>
+              <a:t>6/28/2022</a:t>
             </a:fld>
             <a:endParaRPr lang="en-US"/>
           </a:p>
@@ -2906,7 +2911,7 @@
           <a:p>
             <a:fld id="{B05D53FB-63B3-4B71-A26A-64EB68AD5861}" type="datetimeFigureOut">
               <a:rPr lang="en-US" smtClean="0"/>
-              <a:t>6/27/2022</a:t>
+              <a:t>6/28/2022</a:t>
             </a:fld>
             <a:endParaRPr lang="en-US"/>
           </a:p>
@@ -3491,6 +3496,318 @@
           </a:prstGeom>
         </p:spPr>
       </p:pic>
+      <p:sp>
+        <p:nvSpPr>
+          <p:cNvPr id="2" name="Rectangle 1">
+            <a:extLst>
+              <a:ext uri="{FF2B5EF4-FFF2-40B4-BE49-F238E27FC236}">
+                <a16:creationId xmlns:a16="http://schemas.microsoft.com/office/drawing/2014/main" id="{6344898C-A650-AF8F-ECEF-3C2069BA5E2C}"/>
+              </a:ext>
+            </a:extLst>
+          </p:cNvPr>
+          <p:cNvSpPr/>
+          <p:nvPr/>
+        </p:nvSpPr>
+        <p:spPr>
+          <a:xfrm>
+            <a:off x="1133856" y="4907280"/>
+            <a:ext cx="2767584" cy="1487424"/>
+          </a:xfrm>
+          <a:prstGeom prst="rect">
+            <a:avLst/>
+          </a:prstGeom>
+          <a:noFill/>
+          <a:ln w="76200">
+            <a:solidFill>
+              <a:srgbClr val="FFFF00"/>
+            </a:solidFill>
+          </a:ln>
+        </p:spPr>
+        <p:style>
+          <a:lnRef idx="2">
+            <a:schemeClr val="accent1">
+              <a:shade val="50000"/>
+            </a:schemeClr>
+          </a:lnRef>
+          <a:fillRef idx="1">
+            <a:schemeClr val="accent1"/>
+          </a:fillRef>
+          <a:effectRef idx="0">
+            <a:schemeClr val="accent1"/>
+          </a:effectRef>
+          <a:fontRef idx="minor">
+            <a:schemeClr val="lt1"/>
+          </a:fontRef>
+        </p:style>
+        <p:txBody>
+          <a:bodyPr rtlCol="0" anchor="ctr"/>
+          <a:lstStyle/>
+          <a:p>
+            <a:pPr algn="ctr"/>
+            <a:endParaRPr lang="en-US"/>
+          </a:p>
+        </p:txBody>
+      </p:sp>
+      <p:sp>
+        <p:nvSpPr>
+          <p:cNvPr id="4" name="Rectangle 3">
+            <a:extLst>
+              <a:ext uri="{FF2B5EF4-FFF2-40B4-BE49-F238E27FC236}">
+                <a16:creationId xmlns:a16="http://schemas.microsoft.com/office/drawing/2014/main" id="{4C96083E-DE52-93C1-E601-1D7543AC8A79}"/>
+              </a:ext>
+            </a:extLst>
+          </p:cNvPr>
+          <p:cNvSpPr/>
+          <p:nvPr/>
+        </p:nvSpPr>
+        <p:spPr>
+          <a:xfrm>
+            <a:off x="5138928" y="4998720"/>
+            <a:ext cx="2767584" cy="1383792"/>
+          </a:xfrm>
+          <a:prstGeom prst="rect">
+            <a:avLst/>
+          </a:prstGeom>
+          <a:noFill/>
+          <a:ln w="76200">
+            <a:solidFill>
+              <a:srgbClr val="FFFF00"/>
+            </a:solidFill>
+          </a:ln>
+        </p:spPr>
+        <p:style>
+          <a:lnRef idx="2">
+            <a:schemeClr val="accent1">
+              <a:shade val="50000"/>
+            </a:schemeClr>
+          </a:lnRef>
+          <a:fillRef idx="1">
+            <a:schemeClr val="accent1"/>
+          </a:fillRef>
+          <a:effectRef idx="0">
+            <a:schemeClr val="accent1"/>
+          </a:effectRef>
+          <a:fontRef idx="minor">
+            <a:schemeClr val="lt1"/>
+          </a:fontRef>
+        </p:style>
+        <p:txBody>
+          <a:bodyPr rtlCol="0" anchor="ctr"/>
+          <a:lstStyle/>
+          <a:p>
+            <a:pPr algn="ctr"/>
+            <a:endParaRPr lang="en-US"/>
+          </a:p>
+        </p:txBody>
+      </p:sp>
+      <p:sp>
+        <p:nvSpPr>
+          <p:cNvPr id="6" name="Rectangle 5">
+            <a:extLst>
+              <a:ext uri="{FF2B5EF4-FFF2-40B4-BE49-F238E27FC236}">
+                <a16:creationId xmlns:a16="http://schemas.microsoft.com/office/drawing/2014/main" id="{49999A6F-C83A-FC10-D55E-2DCCC82AE709}"/>
+              </a:ext>
+            </a:extLst>
+          </p:cNvPr>
+          <p:cNvSpPr/>
+          <p:nvPr/>
+        </p:nvSpPr>
+        <p:spPr>
+          <a:xfrm>
+            <a:off x="9290304" y="5559552"/>
+            <a:ext cx="2767584" cy="822960"/>
+          </a:xfrm>
+          <a:prstGeom prst="rect">
+            <a:avLst/>
+          </a:prstGeom>
+          <a:noFill/>
+          <a:ln w="76200">
+            <a:solidFill>
+              <a:srgbClr val="FFFF00"/>
+            </a:solidFill>
+          </a:ln>
+        </p:spPr>
+        <p:style>
+          <a:lnRef idx="2">
+            <a:schemeClr val="accent1">
+              <a:shade val="50000"/>
+            </a:schemeClr>
+          </a:lnRef>
+          <a:fillRef idx="1">
+            <a:schemeClr val="accent1"/>
+          </a:fillRef>
+          <a:effectRef idx="0">
+            <a:schemeClr val="accent1"/>
+          </a:effectRef>
+          <a:fontRef idx="minor">
+            <a:schemeClr val="lt1"/>
+          </a:fontRef>
+        </p:style>
+        <p:txBody>
+          <a:bodyPr rtlCol="0" anchor="ctr"/>
+          <a:lstStyle/>
+          <a:p>
+            <a:pPr algn="ctr"/>
+            <a:endParaRPr lang="en-US"/>
+          </a:p>
+        </p:txBody>
+      </p:sp>
+      <p:sp>
+        <p:nvSpPr>
+          <p:cNvPr id="7" name="Rectangle 6">
+            <a:extLst>
+              <a:ext uri="{FF2B5EF4-FFF2-40B4-BE49-F238E27FC236}">
+                <a16:creationId xmlns:a16="http://schemas.microsoft.com/office/drawing/2014/main" id="{BFE46310-E2B6-F230-BABA-36A6A5A64A26}"/>
+              </a:ext>
+            </a:extLst>
+          </p:cNvPr>
+          <p:cNvSpPr/>
+          <p:nvPr/>
+        </p:nvSpPr>
+        <p:spPr>
+          <a:xfrm>
+            <a:off x="1286256" y="3139440"/>
+            <a:ext cx="2420112" cy="1700784"/>
+          </a:xfrm>
+          <a:prstGeom prst="rect">
+            <a:avLst/>
+          </a:prstGeom>
+          <a:noFill/>
+          <a:ln w="76200">
+            <a:solidFill>
+              <a:schemeClr val="tx1"/>
+            </a:solidFill>
+          </a:ln>
+        </p:spPr>
+        <p:style>
+          <a:lnRef idx="2">
+            <a:schemeClr val="accent1">
+              <a:shade val="50000"/>
+            </a:schemeClr>
+          </a:lnRef>
+          <a:fillRef idx="1">
+            <a:schemeClr val="accent1"/>
+          </a:fillRef>
+          <a:effectRef idx="0">
+            <a:schemeClr val="accent1"/>
+          </a:effectRef>
+          <a:fontRef idx="minor">
+            <a:schemeClr val="lt1"/>
+          </a:fontRef>
+        </p:style>
+        <p:txBody>
+          <a:bodyPr rtlCol="0" anchor="ctr"/>
+          <a:lstStyle/>
+          <a:p>
+            <a:pPr algn="ctr"/>
+            <a:endParaRPr lang="en-US"/>
+          </a:p>
+        </p:txBody>
+      </p:sp>
+      <p:sp>
+        <p:nvSpPr>
+          <p:cNvPr id="8" name="Rectangle 7">
+            <a:extLst>
+              <a:ext uri="{FF2B5EF4-FFF2-40B4-BE49-F238E27FC236}">
+                <a16:creationId xmlns:a16="http://schemas.microsoft.com/office/drawing/2014/main" id="{8C0546E1-8109-E404-C436-A12086439095}"/>
+              </a:ext>
+            </a:extLst>
+          </p:cNvPr>
+          <p:cNvSpPr/>
+          <p:nvPr/>
+        </p:nvSpPr>
+        <p:spPr>
+          <a:xfrm>
+            <a:off x="5285232" y="3797808"/>
+            <a:ext cx="2621280" cy="1106424"/>
+          </a:xfrm>
+          <a:prstGeom prst="rect">
+            <a:avLst/>
+          </a:prstGeom>
+          <a:noFill/>
+          <a:ln w="76200">
+            <a:solidFill>
+              <a:schemeClr val="tx1"/>
+            </a:solidFill>
+          </a:ln>
+        </p:spPr>
+        <p:style>
+          <a:lnRef idx="2">
+            <a:schemeClr val="accent1">
+              <a:shade val="50000"/>
+            </a:schemeClr>
+          </a:lnRef>
+          <a:fillRef idx="1">
+            <a:schemeClr val="accent1"/>
+          </a:fillRef>
+          <a:effectRef idx="0">
+            <a:schemeClr val="accent1"/>
+          </a:effectRef>
+          <a:fontRef idx="minor">
+            <a:schemeClr val="lt1"/>
+          </a:fontRef>
+        </p:style>
+        <p:txBody>
+          <a:bodyPr rtlCol="0" anchor="ctr"/>
+          <a:lstStyle/>
+          <a:p>
+            <a:pPr algn="ctr"/>
+            <a:endParaRPr lang="en-US"/>
+          </a:p>
+        </p:txBody>
+      </p:sp>
+      <p:sp>
+        <p:nvSpPr>
+          <p:cNvPr id="9" name="Rectangle 8">
+            <a:extLst>
+              <a:ext uri="{FF2B5EF4-FFF2-40B4-BE49-F238E27FC236}">
+                <a16:creationId xmlns:a16="http://schemas.microsoft.com/office/drawing/2014/main" id="{D839DDC4-3EF4-74CA-ED73-29D5D022045F}"/>
+              </a:ext>
+            </a:extLst>
+          </p:cNvPr>
+          <p:cNvSpPr/>
+          <p:nvPr/>
+        </p:nvSpPr>
+        <p:spPr>
+          <a:xfrm>
+            <a:off x="9464040" y="4364736"/>
+            <a:ext cx="2420112" cy="1100328"/>
+          </a:xfrm>
+          <a:prstGeom prst="rect">
+            <a:avLst/>
+          </a:prstGeom>
+          <a:noFill/>
+          <a:ln w="76200">
+            <a:solidFill>
+              <a:schemeClr val="tx1"/>
+            </a:solidFill>
+          </a:ln>
+        </p:spPr>
+        <p:style>
+          <a:lnRef idx="2">
+            <a:schemeClr val="accent1">
+              <a:shade val="50000"/>
+            </a:schemeClr>
+          </a:lnRef>
+          <a:fillRef idx="1">
+            <a:schemeClr val="accent1"/>
+          </a:fillRef>
+          <a:effectRef idx="0">
+            <a:schemeClr val="accent1"/>
+          </a:effectRef>
+          <a:fontRef idx="minor">
+            <a:schemeClr val="lt1"/>
+          </a:fontRef>
+        </p:style>
+        <p:txBody>
+          <a:bodyPr rtlCol="0" anchor="ctr"/>
+          <a:lstStyle/>
+          <a:p>
+            <a:pPr algn="ctr"/>
+            <a:endParaRPr lang="en-US"/>
+          </a:p>
+        </p:txBody>
+      </p:sp>
     </p:spTree>
     <p:extLst>
       <p:ext uri="{BB962C8B-B14F-4D97-AF65-F5344CB8AC3E}">

</xml_diff>